<commit_message>
updated shiny app with new numbers and conceptual model
</commit_message>
<xml_diff>
--- a/population_flowcharts.pptx
+++ b/population_flowcharts.pptx
@@ -247,7 +247,7 @@
           <a:p>
             <a:fld id="{EF4F6BCE-6E81-4B9F-9592-2A70BA53637F}" type="datetimeFigureOut">
               <a:rPr lang="en-US" smtClean="0"/>
-              <a:t>6/27/2017</a:t>
+              <a:t>7/14/2017</a:t>
             </a:fld>
             <a:endParaRPr lang="en-US" dirty="0"/>
           </a:p>
@@ -415,7 +415,7 @@
           <a:p>
             <a:fld id="{EF4F6BCE-6E81-4B9F-9592-2A70BA53637F}" type="datetimeFigureOut">
               <a:rPr lang="en-US" smtClean="0"/>
-              <a:t>6/27/2017</a:t>
+              <a:t>7/14/2017</a:t>
             </a:fld>
             <a:endParaRPr lang="en-US" dirty="0"/>
           </a:p>
@@ -593,7 +593,7 @@
           <a:p>
             <a:fld id="{EF4F6BCE-6E81-4B9F-9592-2A70BA53637F}" type="datetimeFigureOut">
               <a:rPr lang="en-US" smtClean="0"/>
-              <a:t>6/27/2017</a:t>
+              <a:t>7/14/2017</a:t>
             </a:fld>
             <a:endParaRPr lang="en-US" dirty="0"/>
           </a:p>
@@ -761,7 +761,7 @@
           <a:p>
             <a:fld id="{EF4F6BCE-6E81-4B9F-9592-2A70BA53637F}" type="datetimeFigureOut">
               <a:rPr lang="en-US" smtClean="0"/>
-              <a:t>6/27/2017</a:t>
+              <a:t>7/14/2017</a:t>
             </a:fld>
             <a:endParaRPr lang="en-US" dirty="0"/>
           </a:p>
@@ -1006,7 +1006,7 @@
           <a:p>
             <a:fld id="{EF4F6BCE-6E81-4B9F-9592-2A70BA53637F}" type="datetimeFigureOut">
               <a:rPr lang="en-US" smtClean="0"/>
-              <a:t>6/27/2017</a:t>
+              <a:t>7/14/2017</a:t>
             </a:fld>
             <a:endParaRPr lang="en-US" dirty="0"/>
           </a:p>
@@ -1235,7 +1235,7 @@
           <a:p>
             <a:fld id="{EF4F6BCE-6E81-4B9F-9592-2A70BA53637F}" type="datetimeFigureOut">
               <a:rPr lang="en-US" smtClean="0"/>
-              <a:t>6/27/2017</a:t>
+              <a:t>7/14/2017</a:t>
             </a:fld>
             <a:endParaRPr lang="en-US" dirty="0"/>
           </a:p>
@@ -1599,7 +1599,7 @@
           <a:p>
             <a:fld id="{EF4F6BCE-6E81-4B9F-9592-2A70BA53637F}" type="datetimeFigureOut">
               <a:rPr lang="en-US" smtClean="0"/>
-              <a:t>6/27/2017</a:t>
+              <a:t>7/14/2017</a:t>
             </a:fld>
             <a:endParaRPr lang="en-US" dirty="0"/>
           </a:p>
@@ -1716,7 +1716,7 @@
           <a:p>
             <a:fld id="{EF4F6BCE-6E81-4B9F-9592-2A70BA53637F}" type="datetimeFigureOut">
               <a:rPr lang="en-US" smtClean="0"/>
-              <a:t>6/27/2017</a:t>
+              <a:t>7/14/2017</a:t>
             </a:fld>
             <a:endParaRPr lang="en-US" dirty="0"/>
           </a:p>
@@ -1811,7 +1811,7 @@
           <a:p>
             <a:fld id="{EF4F6BCE-6E81-4B9F-9592-2A70BA53637F}" type="datetimeFigureOut">
               <a:rPr lang="en-US" smtClean="0"/>
-              <a:t>6/27/2017</a:t>
+              <a:t>7/14/2017</a:t>
             </a:fld>
             <a:endParaRPr lang="en-US" dirty="0"/>
           </a:p>
@@ -2086,7 +2086,7 @@
           <a:p>
             <a:fld id="{EF4F6BCE-6E81-4B9F-9592-2A70BA53637F}" type="datetimeFigureOut">
               <a:rPr lang="en-US" smtClean="0"/>
-              <a:t>6/27/2017</a:t>
+              <a:t>7/14/2017</a:t>
             </a:fld>
             <a:endParaRPr lang="en-US" dirty="0"/>
           </a:p>
@@ -2338,7 +2338,7 @@
           <a:p>
             <a:fld id="{EF4F6BCE-6E81-4B9F-9592-2A70BA53637F}" type="datetimeFigureOut">
               <a:rPr lang="en-US" smtClean="0"/>
-              <a:t>6/27/2017</a:t>
+              <a:t>7/14/2017</a:t>
             </a:fld>
             <a:endParaRPr lang="en-US" dirty="0"/>
           </a:p>
@@ -2549,7 +2549,7 @@
           <a:p>
             <a:fld id="{EF4F6BCE-6E81-4B9F-9592-2A70BA53637F}" type="datetimeFigureOut">
               <a:rPr lang="en-US" smtClean="0"/>
-              <a:t>6/27/2017</a:t>
+              <a:t>7/14/2017</a:t>
             </a:fld>
             <a:endParaRPr lang="en-US" dirty="0"/>
           </a:p>
@@ -4191,8 +4191,8 @@
         </p:nvSpPr>
         <p:spPr>
           <a:xfrm>
-            <a:off x="434917" y="42312"/>
-            <a:ext cx="2447060" cy="6771084"/>
+            <a:off x="235527" y="42312"/>
+            <a:ext cx="2646450" cy="6986528"/>
           </a:xfrm>
           <a:prstGeom prst="rect">
             <a:avLst/>
@@ -4222,8 +4222,23 @@
               <a:rPr lang="en-US" sz="1400" dirty="0">
                 <a:latin typeface="Helvetica" panose="020B0504020202030204" pitchFamily="34" charset="0"/>
               </a:rPr>
-              <a:t>   *Staying pre-recruit</a:t>
-            </a:r>
+              <a:t>   Staying pre-recruit</a:t>
+            </a:r>
+            <a:r>
+              <a:rPr lang="en-US" sz="1400" baseline="30000" dirty="0">
+                <a:latin typeface="Helvetica" panose="020B0504020202030204" pitchFamily="34" charset="0"/>
+              </a:rPr>
+              <a:t>◊</a:t>
+            </a:r>
+            <a:r>
+              <a:rPr lang="en-US" sz="1400" baseline="-25000" dirty="0">
+                <a:latin typeface="Helvetica" panose="020B0504020202030204" pitchFamily="34" charset="0"/>
+              </a:rPr>
+              <a:t> </a:t>
+            </a:r>
+            <a:endParaRPr lang="en-US" sz="1400" dirty="0">
+              <a:latin typeface="Helvetica" panose="020B0504020202030204" pitchFamily="34" charset="0"/>
+            </a:endParaRPr>
           </a:p>
           <a:p>
             <a:r>
@@ -4262,8 +4277,23 @@
               <a:rPr lang="en-US" sz="1400" dirty="0">
                 <a:latin typeface="Helvetica" panose="020B0504020202030204" pitchFamily="34" charset="0"/>
               </a:rPr>
-              <a:t>   *Pre-recruit to recruit</a:t>
-            </a:r>
+              <a:t>   Pre-recruit to recruit</a:t>
+            </a:r>
+            <a:r>
+              <a:rPr lang="en-US" sz="1400" baseline="30000" dirty="0">
+                <a:latin typeface="Helvetica" panose="020B0504020202030204" pitchFamily="34" charset="0"/>
+              </a:rPr>
+              <a:t>◊</a:t>
+            </a:r>
+            <a:r>
+              <a:rPr lang="en-US" sz="1400" baseline="-25000" dirty="0">
+                <a:latin typeface="Helvetica" panose="020B0504020202030204" pitchFamily="34" charset="0"/>
+              </a:rPr>
+              <a:t> </a:t>
+            </a:r>
+            <a:endParaRPr lang="en-US" sz="1400" dirty="0">
+              <a:latin typeface="Helvetica" panose="020B0504020202030204" pitchFamily="34" charset="0"/>
+            </a:endParaRPr>
           </a:p>
           <a:p>
             <a:r>
@@ -4324,8 +4354,17 @@
               <a:rPr lang="en-US" sz="1400" dirty="0">
                 <a:latin typeface="Helvetica" panose="020B0504020202030204" pitchFamily="34" charset="0"/>
               </a:rPr>
-              <a:t>   *Pre-recruits</a:t>
-            </a:r>
+              <a:t>   Pre-recruits</a:t>
+            </a:r>
+            <a:r>
+              <a:rPr lang="en-US" sz="1400" dirty="0">
+                <a:latin typeface="Helvetica" panose="020B0504020202030204" pitchFamily="34" charset="0"/>
+              </a:rPr>
+              <a:t> (Nickerson 1975)</a:t>
+            </a:r>
+            <a:endParaRPr lang="en-US" sz="1400" dirty="0">
+              <a:latin typeface="Helvetica" panose="020B0504020202030204" pitchFamily="34" charset="0"/>
+            </a:endParaRPr>
           </a:p>
           <a:p>
             <a:r>
@@ -4356,7 +4395,7 @@
               <a:rPr lang="en-US" sz="1400" dirty="0">
                 <a:latin typeface="Helvetica" panose="020B0504020202030204" pitchFamily="34" charset="0"/>
               </a:rPr>
-              <a:t> = 0.11</a:t>
+              <a:t> = 0.089</a:t>
             </a:r>
           </a:p>
           <a:p>
@@ -4364,7 +4403,7 @@
               <a:rPr lang="en-US" sz="1400" dirty="0">
                 <a:latin typeface="Helvetica" panose="020B0504020202030204" pitchFamily="34" charset="0"/>
               </a:rPr>
-              <a:t>   *Recruits</a:t>
+              <a:t>   Recruits (Nickerson 1975)</a:t>
             </a:r>
           </a:p>
           <a:p>
@@ -4396,7 +4435,7 @@
               <a:rPr lang="en-US" sz="1400" dirty="0">
                 <a:latin typeface="Helvetica" panose="020B0504020202030204" pitchFamily="34" charset="0"/>
               </a:rPr>
-              <a:t> = 0.70</a:t>
+              <a:t> = 0.40</a:t>
             </a:r>
           </a:p>
           <a:p>
@@ -4404,7 +4443,7 @@
               <a:rPr lang="en-US" sz="1400" dirty="0">
                 <a:latin typeface="Helvetica" panose="020B0504020202030204" pitchFamily="34" charset="0"/>
               </a:rPr>
-              <a:t>   *Eggs</a:t>
+              <a:t>   Eggs*</a:t>
             </a:r>
           </a:p>
           <a:p>
@@ -4445,7 +4484,7 @@
               <a:rPr lang="en-US" sz="1400" dirty="0">
                 <a:latin typeface="Helvetica" panose="020B0504020202030204" pitchFamily="34" charset="0"/>
               </a:rPr>
-              <a:t>= 0.000056</a:t>
+              <a:t>= 2.9e-6</a:t>
             </a:r>
           </a:p>
           <a:p>
@@ -4453,19 +4492,7 @@
               <a:rPr lang="en-US" sz="1400" dirty="0">
                 <a:latin typeface="Helvetica" panose="020B0504020202030204" pitchFamily="34" charset="0"/>
               </a:rPr>
-              <a:t>   </a:t>
-            </a:r>
-            <a:r>
-              <a:rPr lang="en-US" sz="1400" baseline="30000" dirty="0">
-                <a:latin typeface="Helvetica" panose="020B0504020202030204" pitchFamily="34" charset="0"/>
-              </a:rPr>
-              <a:t>◊</a:t>
-            </a:r>
-            <a:r>
-              <a:rPr lang="en-US" sz="1400" dirty="0">
-                <a:latin typeface="Helvetica" panose="020B0504020202030204" pitchFamily="34" charset="0"/>
-              </a:rPr>
-              <a:t>Harvest rate</a:t>
+              <a:t>   Harvest rate (WDFW)</a:t>
             </a:r>
           </a:p>
           <a:p>
@@ -4493,10 +4520,10 @@
           </a:p>
           <a:p>
             <a:r>
-              <a:rPr lang="en-US" sz="1400" b="1" dirty="0">
-                <a:latin typeface="Helvetica" panose="020B0504020202030204" pitchFamily="34" charset="0"/>
-              </a:rPr>
-              <a:t>   </a:t>
+              <a:rPr lang="en-US" sz="1400" dirty="0">
+                <a:latin typeface="Helvetica" panose="020B0504020202030204" pitchFamily="34" charset="0"/>
+              </a:rPr>
+              <a:t>   Years as adult</a:t>
             </a:r>
             <a:r>
               <a:rPr lang="en-US" sz="1400" baseline="30000" dirty="0">
@@ -4504,12 +4531,9 @@
               </a:rPr>
               <a:t>◊</a:t>
             </a:r>
-            <a:r>
-              <a:rPr lang="en-US" sz="1400" dirty="0">
-                <a:latin typeface="Helvetica" panose="020B0504020202030204" pitchFamily="34" charset="0"/>
-              </a:rPr>
-              <a:t>Years as adult</a:t>
-            </a:r>
+            <a:endParaRPr lang="en-US" sz="1400" dirty="0">
+              <a:latin typeface="Helvetica" panose="020B0504020202030204" pitchFamily="34" charset="0"/>
+            </a:endParaRPr>
           </a:p>
           <a:p>
             <a:r>
@@ -4558,7 +4582,7 @@
               <a:rPr lang="en-US" sz="1400" dirty="0">
                 <a:latin typeface="Helvetica" panose="020B0504020202030204" pitchFamily="34" charset="0"/>
               </a:rPr>
-              <a:t>   </a:t>
+              <a:t>   Proportion female</a:t>
             </a:r>
             <a:r>
               <a:rPr lang="en-US" sz="1400" baseline="30000" dirty="0">
@@ -4570,7 +4594,7 @@
               <a:rPr lang="en-US" sz="1400" dirty="0">
                 <a:latin typeface="Helvetica" panose="020B0504020202030204" pitchFamily="34" charset="0"/>
               </a:rPr>
-              <a:t>Proportion female </a:t>
+              <a:t> </a:t>
             </a:r>
           </a:p>
           <a:p>
@@ -4610,19 +4634,19 @@
               <a:rPr lang="en-US" sz="1400" dirty="0">
                 <a:latin typeface="Helvetica" panose="020B0504020202030204" pitchFamily="34" charset="0"/>
               </a:rPr>
-              <a:t>   </a:t>
-            </a:r>
-            <a:r>
-              <a:rPr lang="en-US" sz="1400" baseline="30000" dirty="0">
-                <a:latin typeface="Helvetica" panose="020B0504020202030204" pitchFamily="34" charset="0"/>
-              </a:rPr>
-              <a:t>◊</a:t>
+              <a:t>   Fecundity (</a:t>
+            </a:r>
+            <a:r>
+              <a:rPr lang="en-US" sz="1400" dirty="0" err="1">
+                <a:latin typeface="Helvetica" panose="020B0504020202030204" pitchFamily="34" charset="0"/>
+              </a:rPr>
+              <a:t>McMillin</a:t>
             </a:r>
             <a:r>
               <a:rPr lang="en-US" sz="1400" dirty="0">
                 <a:latin typeface="Helvetica" panose="020B0504020202030204" pitchFamily="34" charset="0"/>
               </a:rPr>
-              <a:t>Number of Eggs </a:t>
+              <a:t> 1925)</a:t>
             </a:r>
           </a:p>
           <a:p>
@@ -4651,7 +4675,7 @@
               <a:rPr lang="en-US" sz="1400" dirty="0">
                 <a:latin typeface="Helvetica" panose="020B0504020202030204" pitchFamily="34" charset="0"/>
               </a:rPr>
-              <a:t> = 300,000</a:t>
+              <a:t> = 8e6</a:t>
             </a:r>
           </a:p>
           <a:p>
@@ -4672,7 +4696,7 @@
               <a:rPr lang="en-US" sz="1400" dirty="0">
                 <a:latin typeface="Helvetica" panose="020B0504020202030204" pitchFamily="34" charset="0"/>
               </a:rPr>
-              <a:t>   *Shape parameter</a:t>
+              <a:t>   Shape parameter*</a:t>
             </a:r>
           </a:p>
           <a:p>
@@ -4706,12 +4730,6 @@
               <a:t>   </a:t>
             </a:r>
             <a:r>
-              <a:rPr lang="en-US" sz="1400" b="1" dirty="0">
-                <a:latin typeface="Helvetica" panose="020B0504020202030204" pitchFamily="34" charset="0"/>
-              </a:rPr>
-              <a:t>*</a:t>
-            </a:r>
-            <a:r>
               <a:rPr lang="en-US" sz="1400" dirty="0">
                 <a:latin typeface="Helvetica" panose="020B0504020202030204" pitchFamily="34" charset="0"/>
               </a:rPr>
@@ -4738,7 +4756,7 @@
               <a:rPr lang="en-US" sz="1400" i="1" dirty="0">
                 <a:latin typeface="Helvetica" panose="020B0504020202030204" pitchFamily="34" charset="0"/>
               </a:rPr>
-              <a:t> = variable</a:t>
+              <a:t> = calculated</a:t>
             </a:r>
           </a:p>
           <a:p>
@@ -4747,12 +4765,6 @@
                 <a:latin typeface="Helvetica" panose="020B0504020202030204" pitchFamily="34" charset="0"/>
               </a:rPr>
               <a:t>   </a:t>
-            </a:r>
-            <a:r>
-              <a:rPr lang="en-US" sz="1400" b="1" dirty="0">
-                <a:latin typeface="Helvetica" panose="020B0504020202030204" pitchFamily="34" charset="0"/>
-              </a:rPr>
-              <a:t>*</a:t>
             </a:r>
             <a:r>
               <a:rPr lang="en-US" sz="1400" dirty="0">
@@ -4780,9 +4792,6 @@
               </a:rPr>
               <a:t> = 1</a:t>
             </a:r>
-            <a:endParaRPr lang="en-US" sz="1400" dirty="0">
-              <a:latin typeface="Helvetica" panose="020B0504020202030204" pitchFamily="34" charset="0"/>
-            </a:endParaRPr>
           </a:p>
         </p:txBody>
       </p:sp>
@@ -5690,7 +5699,7 @@
         </p:nvSpPr>
         <p:spPr>
           <a:xfrm>
-            <a:off x="2919663" y="6254570"/>
+            <a:off x="2891954" y="5506424"/>
             <a:ext cx="8149390" cy="523220"/>
           </a:xfrm>
           <a:prstGeom prst="rect">
@@ -5708,7 +5717,7 @@
               <a:rPr lang="en-US" sz="1400" dirty="0">
                 <a:latin typeface="Helvetica" panose="020B0504020202030204" pitchFamily="34" charset="0"/>
               </a:rPr>
-              <a:t>* Number determined based on model tuning to obtain reasonable dynamics.</a:t>
+              <a:t>* Tuned to obtain reasonable dynamics.</a:t>
             </a:r>
           </a:p>
           <a:p>
@@ -5728,11 +5737,91 @@
               <a:rPr lang="en-US" sz="1400" dirty="0">
                 <a:latin typeface="Helvetica" panose="020B0504020202030204" pitchFamily="34" charset="0"/>
               </a:rPr>
-              <a:t>Sourced from literature or communication with razor clam scientists and managers.</a:t>
-            </a:r>
-            <a:endParaRPr lang="en-US" sz="1400" dirty="0">
-              <a:latin typeface="Helvetica" panose="020B0504020202030204" pitchFamily="34" charset="0"/>
-            </a:endParaRPr>
+              <a:t>Based on communication with razor clam scientists and managers.</a:t>
+            </a:r>
+          </a:p>
+        </p:txBody>
+      </p:sp>
+      <p:cxnSp>
+        <p:nvCxnSpPr>
+          <p:cNvPr id="4" name="Straight Connector 3"/>
+          <p:cNvCxnSpPr/>
+          <p:nvPr/>
+        </p:nvCxnSpPr>
+        <p:spPr>
+          <a:xfrm>
+            <a:off x="224589" y="6745706"/>
+            <a:ext cx="2646948" cy="0"/>
+          </a:xfrm>
+          <a:prstGeom prst="line">
+            <a:avLst/>
+          </a:prstGeom>
+          <a:ln w="38100">
+            <a:solidFill>
+              <a:schemeClr val="tx1"/>
+            </a:solidFill>
+          </a:ln>
+        </p:spPr>
+        <p:style>
+          <a:lnRef idx="1">
+            <a:schemeClr val="accent1"/>
+          </a:lnRef>
+          <a:fillRef idx="0">
+            <a:schemeClr val="accent1"/>
+          </a:fillRef>
+          <a:effectRef idx="0">
+            <a:schemeClr val="accent1"/>
+          </a:effectRef>
+          <a:fontRef idx="minor">
+            <a:schemeClr val="tx1"/>
+          </a:fontRef>
+        </p:style>
+      </p:cxnSp>
+      <p:sp>
+        <p:nvSpPr>
+          <p:cNvPr id="5" name="Rectangle 4"/>
+          <p:cNvSpPr/>
+          <p:nvPr/>
+        </p:nvSpPr>
+        <p:spPr>
+          <a:xfrm>
+            <a:off x="176464" y="6753726"/>
+            <a:ext cx="2871537" cy="1002632"/>
+          </a:xfrm>
+          <a:prstGeom prst="rect">
+            <a:avLst/>
+          </a:prstGeom>
+          <a:solidFill>
+            <a:schemeClr val="bg1"/>
+          </a:solidFill>
+          <a:ln>
+            <a:solidFill>
+              <a:schemeClr val="bg1"/>
+            </a:solidFill>
+          </a:ln>
+        </p:spPr>
+        <p:style>
+          <a:lnRef idx="2">
+            <a:schemeClr val="accent1">
+              <a:shade val="50000"/>
+            </a:schemeClr>
+          </a:lnRef>
+          <a:fillRef idx="1">
+            <a:schemeClr val="accent1"/>
+          </a:fillRef>
+          <a:effectRef idx="0">
+            <a:schemeClr val="accent1"/>
+          </a:effectRef>
+          <a:fontRef idx="minor">
+            <a:schemeClr val="lt1"/>
+          </a:fontRef>
+        </p:style>
+        <p:txBody>
+          <a:bodyPr rtlCol="0" anchor="ctr"/>
+          <a:lstStyle/>
+          <a:p>
+            <a:pPr algn="ctr"/>
+            <a:endParaRPr lang="en-US"/>
           </a:p>
         </p:txBody>
       </p:sp>

</xml_diff>